<commit_message>
Update Case Study 1 - David Wei, Neil Benson.pptx
</commit_message>
<xml_diff>
--- a/Analysis Presentations/Case Study 1 - David Wei, Neil Benson.pptx
+++ b/Analysis Presentations/Case Study 1 - David Wei, Neil Benson.pptx
@@ -3359,8 +3359,13 @@
           <a:p>
             <a:r>
               <a:rPr lang="en-US" sz="5400" b="1" dirty="0"/>
-              <a:t>Case Study 1: Beers and Brews</a:t>
-            </a:r>
+              <a:t>Case Study 1: Beers and </a:t>
+            </a:r>
+            <a:r>
+              <a:rPr lang="en-US" sz="5400" b="1" dirty="0" err="1"/>
+              <a:t>BrewERIEs</a:t>
+            </a:r>
+            <a:endParaRPr lang="en-US" sz="5400" b="1" dirty="0"/>
           </a:p>
         </p:txBody>
       </p:sp>
@@ -9154,7 +9159,7 @@
                 <a:latin typeface="Calibri" panose="020F0502020204030204" pitchFamily="34" charset="0"/>
                 <a:cs typeface="Calibri" panose="020F0502020204030204" pitchFamily="34" charset="0"/>
               </a:rPr>
-              <a:t>Almost half (~42%) of IBU data was missing, and a little over 2.5% of AV data was missing.</a:t>
+              <a:t>Almost half (~42%) of IBU data was missing, and a little over 2.5% of ABV data was missing.</a:t>
             </a:r>
           </a:p>
         </p:txBody>
@@ -9287,7 +9292,7 @@
                 <a:latin typeface="Calibri" panose="020F0502020204030204" pitchFamily="34" charset="0"/>
                 <a:cs typeface="Calibri" panose="020F0502020204030204" pitchFamily="34" charset="0"/>
               </a:rPr>
-              <a:t>Filled missing values by applying means of IBU and ABV per style of beer for greater accuracy.</a:t>
+              <a:t>Filled missing values by applying average IBU and ABV per style of beer for greater accuracy.</a:t>
             </a:r>
           </a:p>
         </p:txBody>
@@ -9829,7 +9834,7 @@
             </a:r>
             <a:r>
               <a:rPr lang="en-US" dirty="0"/>
-              <a:t>One thing to note in particular, is the right skew in the distribution since the default definition of "Beer" under federal law is anything greater than 0.5% alcohol</a:t>
+              <a:t>One thing to note in particular, is the right skew in the distribution with the mean hovering around 5% ABV. This is a reflection of market competition, state laws, and history regarding German purity laws.</a:t>
             </a:r>
             <a:endParaRPr lang="en-US" dirty="0">
               <a:latin typeface="Calibri" panose="020F0502020204030204" pitchFamily="34" charset="0"/>
@@ -10201,108 +10206,6 @@
               </a:rPr>
               <a:t> = 0.57</a:t>
             </a:r>
-          </a:p>
-        </p:txBody>
-      </p:sp>
-      <p:sp>
-        <p:nvSpPr>
-          <p:cNvPr id="3" name="Rectangle 1">
-            <a:extLst>
-              <a:ext uri="{FF2B5EF4-FFF2-40B4-BE49-F238E27FC236}">
-                <a16:creationId xmlns:a16="http://schemas.microsoft.com/office/drawing/2014/main" id="{A065350E-AE61-40A0-A2D6-9815DF9B1173}"/>
-              </a:ext>
-            </a:extLst>
-          </p:cNvPr>
-          <p:cNvSpPr>
-            <a:spLocks noChangeArrowheads="1"/>
-          </p:cNvSpPr>
-          <p:nvPr/>
-        </p:nvSpPr>
-        <p:spPr bwMode="auto">
-          <a:xfrm>
-            <a:off x="0" y="0"/>
-            <a:ext cx="12192000" cy="457200"/>
-          </a:xfrm>
-          <a:prstGeom prst="rect">
-            <a:avLst/>
-          </a:prstGeom>
-          <a:solidFill>
-            <a:srgbClr val="FFFFFF"/>
-          </a:solidFill>
-          <a:ln>
-            <a:noFill/>
-          </a:ln>
-          <a:effectLst/>
-          <a:extLst>
-            <a:ext uri="{91240B29-F687-4F45-9708-019B960494DF}">
-              <a14:hiddenLine xmlns:a14="http://schemas.microsoft.com/office/drawing/2010/main" w="9525">
-                <a:solidFill>
-                  <a:schemeClr val="tx1"/>
-                </a:solidFill>
-                <a:miter lim="800000"/>
-                <a:headEnd/>
-                <a:tailEnd/>
-              </a14:hiddenLine>
-            </a:ext>
-            <a:ext uri="{AF507438-7753-43E0-B8FC-AC1667EBCBE1}">
-              <a14:hiddenEffects xmlns:a14="http://schemas.microsoft.com/office/drawing/2010/main">
-                <a:effectLst>
-                  <a:outerShdw dist="35921" dir="2700000" algn="ctr" rotWithShape="0">
-                    <a:schemeClr val="bg2"/>
-                  </a:outerShdw>
-                </a:effectLst>
-              </a14:hiddenEffects>
-            </a:ext>
-          </a:extLst>
-        </p:spPr>
-        <p:txBody>
-          <a:bodyPr vert="horz" wrap="none" lIns="0" tIns="0" rIns="0" bIns="0" numCol="1" anchor="ctr" anchorCtr="0" compatLnSpc="1">
-            <a:prstTxWarp prst="textNoShape">
-              <a:avLst/>
-            </a:prstTxWarp>
-            <a:spAutoFit/>
-          </a:bodyPr>
-          <a:lstStyle/>
-          <a:p>
-            <a:pPr marL="0" marR="0" lvl="0" indent="0" algn="l" defTabSz="914400" rtl="0" eaLnBrk="0" fontAlgn="base" latinLnBrk="0" hangingPunct="0">
-              <a:lnSpc>
-                <a:spcPct val="100000"/>
-              </a:lnSpc>
-              <a:spcBef>
-                <a:spcPct val="0"/>
-              </a:spcBef>
-              <a:spcAft>
-                <a:spcPct val="0"/>
-              </a:spcAft>
-              <a:buClrTx/>
-              <a:buSzTx/>
-              <a:buFontTx/>
-              <a:buNone/>
-              <a:tabLst/>
-            </a:pPr>
-            <a:r>
-              <a:rPr kumimoji="0" lang="en-US" altLang="en-US" sz="900" b="0" i="0" u="none" strike="noStrike" cap="none" normalizeH="0" baseline="0" dirty="0">
-                <a:ln>
-                  <a:noFill/>
-                </a:ln>
-                <a:solidFill>
-                  <a:srgbClr val="000000"/>
-                </a:solidFill>
-                <a:effectLst/>
-                <a:latin typeface="Lucida Console" panose="020B0609040504020204" pitchFamily="49" charset="0"/>
-              </a:rPr>
-              <a:t>0.57</a:t>
-            </a:r>
-            <a:endParaRPr kumimoji="0" lang="en-US" altLang="en-US" sz="1800" b="0" i="0" u="none" strike="noStrike" cap="none" normalizeH="0" baseline="0" dirty="0">
-              <a:ln>
-                <a:noFill/>
-              </a:ln>
-              <a:solidFill>
-                <a:schemeClr val="tx1"/>
-              </a:solidFill>
-              <a:effectLst/>
-              <a:latin typeface="Arial" panose="020B0604020202020204" pitchFamily="34" charset="0"/>
-            </a:endParaRPr>
           </a:p>
         </p:txBody>
       </p:sp>

</xml_diff>